<commit_message>
[Not running] UI DB connecting 0.1
</commit_message>
<xml_diff>
--- a/01_Doc/01_기획/20210306 앱 기획안 - rev 0.pptx
+++ b/01_Doc/01_기획/20210306 앱 기획안 - rev 0.pptx
@@ -4793,7 +4793,7 @@
           <a:p>
             <a:fld id="{35AAA919-26FE-4C52-B0E0-7D09526E0F83}" type="datetimeFigureOut">
               <a:rPr lang="ko-KR" altLang="en-US" smtClean="0"/>
-              <a:t>2021-03-20</a:t>
+              <a:t>2021-04-11</a:t>
             </a:fld>
             <a:endParaRPr lang="ko-KR" altLang="en-US"/>
           </a:p>
@@ -6115,7 +6115,7 @@
           <a:p>
             <a:fld id="{B0C27334-6504-4F16-8F54-2B9BD46EDE9B}" type="datetime1">
               <a:rPr lang="ko-KR" altLang="en-US" smtClean="0"/>
-              <a:t>2021-03-20</a:t>
+              <a:t>2021-04-11</a:t>
             </a:fld>
             <a:endParaRPr lang="ko-KR" altLang="en-US"/>
           </a:p>
@@ -6285,7 +6285,7 @@
           <a:p>
             <a:fld id="{7C830F25-8745-41DD-8358-8687A1143F20}" type="datetime1">
               <a:rPr lang="ko-KR" altLang="en-US" smtClean="0"/>
-              <a:t>2021-03-20</a:t>
+              <a:t>2021-04-11</a:t>
             </a:fld>
             <a:endParaRPr lang="ko-KR" altLang="en-US"/>
           </a:p>
@@ -6465,7 +6465,7 @@
           <a:p>
             <a:fld id="{79319DA4-D6F3-4586-8EB6-24BEFDA6AF85}" type="datetime1">
               <a:rPr lang="ko-KR" altLang="en-US" smtClean="0"/>
-              <a:t>2021-03-20</a:t>
+              <a:t>2021-04-11</a:t>
             </a:fld>
             <a:endParaRPr lang="ko-KR" altLang="en-US"/>
           </a:p>
@@ -6635,7 +6635,7 @@
           <a:p>
             <a:fld id="{857D97C4-0DF6-4A76-8DE7-431866CEFC08}" type="datetime1">
               <a:rPr lang="ko-KR" altLang="en-US" smtClean="0"/>
-              <a:t>2021-03-20</a:t>
+              <a:t>2021-04-11</a:t>
             </a:fld>
             <a:endParaRPr lang="ko-KR" altLang="en-US"/>
           </a:p>
@@ -6879,7 +6879,7 @@
           <a:p>
             <a:fld id="{6408B895-0BFC-4C9F-BE1F-BD203B38C77E}" type="datetime1">
               <a:rPr lang="ko-KR" altLang="en-US" smtClean="0"/>
-              <a:t>2021-03-20</a:t>
+              <a:t>2021-04-11</a:t>
             </a:fld>
             <a:endParaRPr lang="ko-KR" altLang="en-US"/>
           </a:p>
@@ -7111,7 +7111,7 @@
           <a:p>
             <a:fld id="{B95E7418-ABD9-4819-83A8-6D052E2B4C66}" type="datetime1">
               <a:rPr lang="ko-KR" altLang="en-US" smtClean="0"/>
-              <a:t>2021-03-20</a:t>
+              <a:t>2021-04-11</a:t>
             </a:fld>
             <a:endParaRPr lang="ko-KR" altLang="en-US"/>
           </a:p>
@@ -7478,7 +7478,7 @@
           <a:p>
             <a:fld id="{19DE3E94-DF28-48AE-B2DE-7A0D9AD011CA}" type="datetime1">
               <a:rPr lang="ko-KR" altLang="en-US" smtClean="0"/>
-              <a:t>2021-03-20</a:t>
+              <a:t>2021-04-11</a:t>
             </a:fld>
             <a:endParaRPr lang="ko-KR" altLang="en-US"/>
           </a:p>
@@ -7596,7 +7596,7 @@
           <a:p>
             <a:fld id="{4AD0511A-A241-47F9-A29D-436C1B870F3E}" type="datetime1">
               <a:rPr lang="ko-KR" altLang="en-US" smtClean="0"/>
-              <a:t>2021-03-20</a:t>
+              <a:t>2021-04-11</a:t>
             </a:fld>
             <a:endParaRPr lang="ko-KR" altLang="en-US"/>
           </a:p>
@@ -7691,7 +7691,7 @@
           <a:p>
             <a:fld id="{192B224C-21E5-4208-B753-D34DE6808D0B}" type="datetime1">
               <a:rPr lang="ko-KR" altLang="en-US" smtClean="0"/>
-              <a:t>2021-03-20</a:t>
+              <a:t>2021-04-11</a:t>
             </a:fld>
             <a:endParaRPr lang="ko-KR" altLang="en-US"/>
           </a:p>
@@ -7981,7 +7981,7 @@
           <a:p>
             <a:fld id="{AE79B1BC-695F-4ABA-9CA5-16DB40881076}" type="datetime1">
               <a:rPr lang="ko-KR" altLang="en-US" smtClean="0"/>
-              <a:t>2021-03-20</a:t>
+              <a:t>2021-04-11</a:t>
             </a:fld>
             <a:endParaRPr lang="ko-KR" altLang="en-US"/>
           </a:p>
@@ -8238,7 +8238,7 @@
           <a:p>
             <a:fld id="{78016CEF-084A-4C64-8731-C3A76B97C187}" type="datetime1">
               <a:rPr lang="ko-KR" altLang="en-US" smtClean="0"/>
-              <a:t>2021-03-20</a:t>
+              <a:t>2021-04-11</a:t>
             </a:fld>
             <a:endParaRPr lang="ko-KR" altLang="en-US"/>
           </a:p>
@@ -8451,7 +8451,7 @@
           <a:p>
             <a:fld id="{AE50DB45-F958-4CB8-879A-77503D6C8495}" type="datetime1">
               <a:rPr lang="ko-KR" altLang="en-US" smtClean="0"/>
-              <a:t>2021-03-20</a:t>
+              <a:t>2021-04-11</a:t>
             </a:fld>
             <a:endParaRPr lang="ko-KR" altLang="en-US"/>
           </a:p>
@@ -17898,126 +17898,147 @@
           </a:p>
         </p:txBody>
       </p:sp>
-      <p:pic>
-        <p:nvPicPr>
-          <p:cNvPr id="39" name="그림 38">
+      <p:grpSp>
+        <p:nvGrpSpPr>
+          <p:cNvPr id="5" name="그룹 4">
             <a:extLst>
               <a:ext uri="{FF2B5EF4-FFF2-40B4-BE49-F238E27FC236}">
-                <a16:creationId xmlns:a16="http://schemas.microsoft.com/office/drawing/2014/main" id="{656557C3-353A-45FF-B8E3-6D959C8F5855}"/>
+                <a16:creationId xmlns:a16="http://schemas.microsoft.com/office/drawing/2014/main" id="{5F289BC7-0689-4E97-9A1B-F7DC943CCB49}"/>
               </a:ext>
             </a:extLst>
           </p:cNvPr>
-          <p:cNvPicPr>
-            <a:picLocks noChangeAspect="1"/>
-          </p:cNvPicPr>
+          <p:cNvGrpSpPr/>
           <p:nvPr/>
-        </p:nvPicPr>
-        <p:blipFill>
-          <a:blip r:embed="rId14"/>
-          <a:stretch>
-            <a:fillRect/>
-          </a:stretch>
-        </p:blipFill>
-        <p:spPr>
-          <a:xfrm>
-            <a:off x="8484122" y="3330379"/>
-            <a:ext cx="627105" cy="298131"/>
-          </a:xfrm>
-          <a:prstGeom prst="rect">
-            <a:avLst/>
-          </a:prstGeom>
-        </p:spPr>
-      </p:pic>
-      <p:sp>
-        <p:nvSpPr>
-          <p:cNvPr id="40" name="TextBox 39">
-            <a:extLst>
-              <a:ext uri="{FF2B5EF4-FFF2-40B4-BE49-F238E27FC236}">
-                <a16:creationId xmlns:a16="http://schemas.microsoft.com/office/drawing/2014/main" id="{9BE4FBE6-3F5C-47DF-84F9-EF08C7C55B14}"/>
-              </a:ext>
-            </a:extLst>
-          </p:cNvPr>
-          <p:cNvSpPr txBox="1"/>
-          <p:nvPr/>
-        </p:nvSpPr>
-        <p:spPr>
+        </p:nvGrpSpPr>
+        <p:grpSpPr>
           <a:xfrm>
             <a:off x="8451519" y="3328399"/>
             <a:ext cx="676567" cy="307777"/>
+            <a:chOff x="8451519" y="3328399"/>
+            <a:chExt cx="676567" cy="307777"/>
           </a:xfrm>
-          <a:prstGeom prst="rect">
-            <a:avLst/>
-          </a:prstGeom>
-          <a:noFill/>
-          <a:ln>
-            <a:solidFill>
-              <a:schemeClr val="bg1"/>
-            </a:solidFill>
-          </a:ln>
-        </p:spPr>
-        <p:style>
-          <a:lnRef idx="1">
-            <a:schemeClr val="accent4"/>
-          </a:lnRef>
-          <a:fillRef idx="3">
-            <a:schemeClr val="accent4"/>
-          </a:fillRef>
-          <a:effectRef idx="2">
-            <a:schemeClr val="accent4"/>
-          </a:effectRef>
-          <a:fontRef idx="minor">
-            <a:schemeClr val="lt1"/>
-          </a:fontRef>
-        </p:style>
-        <p:txBody>
-          <a:bodyPr wrap="square" lIns="0" tIns="0" rIns="0" bIns="0" rtlCol="0">
-            <a:spAutoFit/>
-          </a:bodyPr>
-          <a:lstStyle/>
-          <a:p>
-            <a:pPr algn="ctr"/>
-            <a:r>
-              <a:rPr lang="ko-KR" altLang="en-US" sz="1000" dirty="0">
-                <a:solidFill>
-                  <a:schemeClr val="tx1"/>
-                </a:solidFill>
-                <a:latin typeface="현대하모니 L" panose="02020603020101020101" pitchFamily="18" charset="-127"/>
-                <a:ea typeface="현대하모니 L" panose="02020603020101020101" pitchFamily="18" charset="-127"/>
-              </a:rPr>
-              <a:t>소월</a:t>
-            </a:r>
-            <a:br>
-              <a:rPr lang="en-US" altLang="ko-KR" sz="1000" dirty="0">
-                <a:solidFill>
-                  <a:schemeClr val="tx1"/>
-                </a:solidFill>
-                <a:latin typeface="현대하모니 L" panose="02020603020101020101" pitchFamily="18" charset="-127"/>
-                <a:ea typeface="현대하모니 L" panose="02020603020101020101" pitchFamily="18" charset="-127"/>
-              </a:rPr>
-            </a:br>
-            <a:r>
-              <a:rPr lang="en-US" altLang="ko-KR" sz="1000" dirty="0">
-                <a:solidFill>
-                  <a:schemeClr val="tx1"/>
-                </a:solidFill>
-                <a:latin typeface="현대하모니 L" panose="02020603020101020101" pitchFamily="18" charset="-127"/>
-                <a:ea typeface="현대하모니 L" panose="02020603020101020101" pitchFamily="18" charset="-127"/>
-              </a:rPr>
-              <a:t>377</a:t>
-            </a:r>
-            <a:r>
-              <a:rPr lang="ko-KR" altLang="en-US" sz="1000" dirty="0">
-                <a:solidFill>
-                  <a:schemeClr val="tx1"/>
-                </a:solidFill>
-                <a:latin typeface="현대하모니 L" panose="02020603020101020101" pitchFamily="18" charset="-127"/>
-                <a:ea typeface="현대하모니 L" panose="02020603020101020101" pitchFamily="18" charset="-127"/>
-              </a:rPr>
-              <a:t>동</a:t>
-            </a:r>
-          </a:p>
-        </p:txBody>
-      </p:sp>
+        </p:grpSpPr>
+        <p:pic>
+          <p:nvPicPr>
+            <p:cNvPr id="39" name="그림 38">
+              <a:extLst>
+                <a:ext uri="{FF2B5EF4-FFF2-40B4-BE49-F238E27FC236}">
+                  <a16:creationId xmlns:a16="http://schemas.microsoft.com/office/drawing/2014/main" id="{656557C3-353A-45FF-B8E3-6D959C8F5855}"/>
+                </a:ext>
+              </a:extLst>
+            </p:cNvPr>
+            <p:cNvPicPr>
+              <a:picLocks noChangeAspect="1"/>
+            </p:cNvPicPr>
+            <p:nvPr/>
+          </p:nvPicPr>
+          <p:blipFill>
+            <a:blip r:embed="rId14"/>
+            <a:stretch>
+              <a:fillRect/>
+            </a:stretch>
+          </p:blipFill>
+          <p:spPr>
+            <a:xfrm>
+              <a:off x="8484122" y="3330379"/>
+              <a:ext cx="627105" cy="298131"/>
+            </a:xfrm>
+            <a:prstGeom prst="rect">
+              <a:avLst/>
+            </a:prstGeom>
+          </p:spPr>
+        </p:pic>
+        <p:sp>
+          <p:nvSpPr>
+            <p:cNvPr id="40" name="TextBox 39">
+              <a:extLst>
+                <a:ext uri="{FF2B5EF4-FFF2-40B4-BE49-F238E27FC236}">
+                  <a16:creationId xmlns:a16="http://schemas.microsoft.com/office/drawing/2014/main" id="{9BE4FBE6-3F5C-47DF-84F9-EF08C7C55B14}"/>
+                </a:ext>
+              </a:extLst>
+            </p:cNvPr>
+            <p:cNvSpPr txBox="1"/>
+            <p:nvPr/>
+          </p:nvSpPr>
+          <p:spPr>
+            <a:xfrm>
+              <a:off x="8451519" y="3328399"/>
+              <a:ext cx="676567" cy="307777"/>
+            </a:xfrm>
+            <a:prstGeom prst="rect">
+              <a:avLst/>
+            </a:prstGeom>
+            <a:noFill/>
+            <a:ln>
+              <a:solidFill>
+                <a:schemeClr val="bg1"/>
+              </a:solidFill>
+            </a:ln>
+          </p:spPr>
+          <p:style>
+            <a:lnRef idx="1">
+              <a:schemeClr val="accent4"/>
+            </a:lnRef>
+            <a:fillRef idx="3">
+              <a:schemeClr val="accent4"/>
+            </a:fillRef>
+            <a:effectRef idx="2">
+              <a:schemeClr val="accent4"/>
+            </a:effectRef>
+            <a:fontRef idx="minor">
+              <a:schemeClr val="lt1"/>
+            </a:fontRef>
+          </p:style>
+          <p:txBody>
+            <a:bodyPr wrap="square" lIns="0" tIns="0" rIns="0" bIns="0" rtlCol="0">
+              <a:spAutoFit/>
+            </a:bodyPr>
+            <a:lstStyle/>
+            <a:p>
+              <a:pPr algn="ctr"/>
+              <a:r>
+                <a:rPr lang="ko-KR" altLang="en-US" sz="1000" dirty="0">
+                  <a:solidFill>
+                    <a:schemeClr val="tx1"/>
+                  </a:solidFill>
+                  <a:latin typeface="현대하모니 L" panose="02020603020101020101" pitchFamily="18" charset="-127"/>
+                  <a:ea typeface="현대하모니 L" panose="02020603020101020101" pitchFamily="18" charset="-127"/>
+                </a:rPr>
+                <a:t>소월</a:t>
+              </a:r>
+              <a:br>
+                <a:rPr lang="en-US" altLang="ko-KR" sz="1000" dirty="0">
+                  <a:solidFill>
+                    <a:schemeClr val="tx1"/>
+                  </a:solidFill>
+                  <a:latin typeface="현대하모니 L" panose="02020603020101020101" pitchFamily="18" charset="-127"/>
+                  <a:ea typeface="현대하모니 L" panose="02020603020101020101" pitchFamily="18" charset="-127"/>
+                </a:rPr>
+              </a:br>
+              <a:r>
+                <a:rPr lang="en-US" altLang="ko-KR" sz="1000" dirty="0">
+                  <a:solidFill>
+                    <a:schemeClr val="tx1"/>
+                  </a:solidFill>
+                  <a:latin typeface="현대하모니 L" panose="02020603020101020101" pitchFamily="18" charset="-127"/>
+                  <a:ea typeface="현대하모니 L" panose="02020603020101020101" pitchFamily="18" charset="-127"/>
+                </a:rPr>
+                <a:t>377</a:t>
+              </a:r>
+              <a:r>
+                <a:rPr lang="ko-KR" altLang="en-US" sz="1000" dirty="0">
+                  <a:solidFill>
+                    <a:schemeClr val="tx1"/>
+                  </a:solidFill>
+                  <a:latin typeface="현대하모니 L" panose="02020603020101020101" pitchFamily="18" charset="-127"/>
+                  <a:ea typeface="현대하모니 L" panose="02020603020101020101" pitchFamily="18" charset="-127"/>
+                </a:rPr>
+                <a:t>동</a:t>
+              </a:r>
+            </a:p>
+          </p:txBody>
+        </p:sp>
+      </p:grpSp>
       <p:sp>
         <p:nvSpPr>
           <p:cNvPr id="41" name="TextBox 40">

</xml_diff>